<commit_message>
Concrete the variable interaction part
</commit_message>
<xml_diff>
--- a/RandomForest Description 16-9-7 final.pptx
+++ b/RandomForest Description 16-9-7 final.pptx
@@ -231,7 +231,7 @@
           <a:p>
             <a:fld id="{E89F685B-7624-4378-832D-5278D6497EF4}" type="datetimeFigureOut">
               <a:rPr lang="zh-CN" altLang="en-US" smtClean="0"/>
-              <a:t>2016/9/7</a:t>
+              <a:t>2016/9/9</a:t>
             </a:fld>
             <a:endParaRPr lang="zh-CN" altLang="en-US"/>
           </a:p>
@@ -583,6 +583,90 @@
 </p:notes>
 </file>
 
+<file path=ppt/notesSlides/notesSlide10.xml><?xml version="1.0" encoding="utf-8"?>
+<p:notes xmlns:a="http://schemas.openxmlformats.org/drawingml/2006/main" xmlns:r="http://schemas.openxmlformats.org/officeDocument/2006/relationships" xmlns:p="http://schemas.openxmlformats.org/presentationml/2006/main">
+  <p:cSld>
+    <p:spTree>
+      <p:nvGrpSpPr>
+        <p:cNvPr id="1" name=""/>
+        <p:cNvGrpSpPr/>
+        <p:nvPr/>
+      </p:nvGrpSpPr>
+      <p:grpSpPr>
+        <a:xfrm>
+          <a:off x="0" y="0"/>
+          <a:ext cx="0" cy="0"/>
+          <a:chOff x="0" y="0"/>
+          <a:chExt cx="0" cy="0"/>
+        </a:xfrm>
+      </p:grpSpPr>
+      <p:sp>
+        <p:nvSpPr>
+          <p:cNvPr id="2" name="幻灯片图像占位符 1"/>
+          <p:cNvSpPr>
+            <a:spLocks noGrp="1" noRot="1" noChangeAspect="1"/>
+          </p:cNvSpPr>
+          <p:nvPr>
+            <p:ph type="sldImg"/>
+          </p:nvPr>
+        </p:nvSpPr>
+        <p:spPr/>
+      </p:sp>
+      <p:sp>
+        <p:nvSpPr>
+          <p:cNvPr id="3" name="备注占位符 2"/>
+          <p:cNvSpPr>
+            <a:spLocks noGrp="1"/>
+          </p:cNvSpPr>
+          <p:nvPr>
+            <p:ph type="body" idx="1"/>
+          </p:nvPr>
+        </p:nvSpPr>
+        <p:spPr/>
+        <p:txBody>
+          <a:bodyPr/>
+          <a:lstStyle/>
+          <a:p>
+            <a:endParaRPr lang="zh-CN" altLang="en-US" dirty="0"/>
+          </a:p>
+        </p:txBody>
+      </p:sp>
+      <p:sp>
+        <p:nvSpPr>
+          <p:cNvPr id="4" name="灯片编号占位符 3"/>
+          <p:cNvSpPr>
+            <a:spLocks noGrp="1"/>
+          </p:cNvSpPr>
+          <p:nvPr>
+            <p:ph type="sldNum" sz="quarter" idx="10"/>
+          </p:nvPr>
+        </p:nvSpPr>
+        <p:spPr/>
+        <p:txBody>
+          <a:bodyPr/>
+          <a:lstStyle/>
+          <a:p>
+            <a:fld id="{54B2DB04-1C30-4E5B-BA41-14DB75A5FA96}" type="slidenum">
+              <a:rPr lang="zh-CN" altLang="en-US" smtClean="0"/>
+              <a:t>23</a:t>
+            </a:fld>
+            <a:endParaRPr lang="zh-CN" altLang="en-US"/>
+          </a:p>
+        </p:txBody>
+      </p:sp>
+    </p:spTree>
+    <p:extLst>
+      <p:ext uri="{BB962C8B-B14F-4D97-AF65-F5344CB8AC3E}">
+        <p14:creationId xmlns:p14="http://schemas.microsoft.com/office/powerpoint/2010/main" val="2191718827"/>
+      </p:ext>
+    </p:extLst>
+  </p:cSld>
+  <p:clrMapOvr>
+    <a:masterClrMapping/>
+  </p:clrMapOvr>
+</p:notes>
+</file>
+
 <file path=ppt/notesSlides/notesSlide2.xml><?xml version="1.0" encoding="utf-8"?>
 <p:notes xmlns:a="http://schemas.openxmlformats.org/drawingml/2006/main" xmlns:r="http://schemas.openxmlformats.org/officeDocument/2006/relationships" xmlns:p="http://schemas.openxmlformats.org/presentationml/2006/main">
   <p:cSld>
@@ -903,6 +987,58 @@
           <a:bodyPr/>
           <a:lstStyle/>
           <a:p>
+            <a:r>
+              <a:rPr lang="en-US" altLang="zh-CN" dirty="0" smtClean="0"/>
+              <a:t>Correlation?     1 </a:t>
+            </a:r>
+            <a:r>
+              <a:rPr lang="en-US" altLang="zh-CN" dirty="0" smtClean="0">
+                <a:sym typeface="Wingdings" panose="05000000000000000000" pitchFamily="2" charset="2"/>
+              </a:rPr>
+              <a:t>---</a:t>
+            </a:r>
+            <a:r>
+              <a:rPr lang="en-US" altLang="zh-CN" baseline="0" dirty="0" smtClean="0"/>
+              <a:t> 1    </a:t>
+            </a:r>
+            <a:r>
+              <a:rPr lang="zh-CN" altLang="en-US" baseline="0" dirty="0" smtClean="0"/>
+              <a:t>多个特征亮亮互相相关</a:t>
+            </a:r>
+            <a:endParaRPr lang="en-US" altLang="zh-CN" dirty="0" smtClean="0"/>
+          </a:p>
+          <a:p>
+            <a:r>
+              <a:rPr lang="zh-CN" altLang="en-US" dirty="0" smtClean="0"/>
+              <a:t>酶有无和蛋白质活力  与 生物机体 细胞的活力。。不是相关性 </a:t>
+            </a:r>
+            <a:r>
+              <a:rPr lang="en-US" altLang="zh-CN" baseline="0" dirty="0" smtClean="0"/>
+              <a:t>  1</a:t>
+            </a:r>
+            <a:r>
+              <a:rPr lang="en-US" altLang="zh-CN" baseline="0" dirty="0" smtClean="0">
+                <a:sym typeface="Wingdings" panose="05000000000000000000" pitchFamily="2" charset="2"/>
+              </a:rPr>
+              <a:t> 1    </a:t>
+            </a:r>
+          </a:p>
+          <a:p>
+            <a:r>
+              <a:rPr lang="en-US" altLang="zh-CN" baseline="0" dirty="0" smtClean="0">
+                <a:sym typeface="Wingdings" panose="05000000000000000000" pitchFamily="2" charset="2"/>
+              </a:rPr>
+              <a:t>more complicated: </a:t>
+            </a:r>
+            <a:r>
+              <a:rPr lang="zh-CN" altLang="en-US" baseline="0" dirty="0" smtClean="0">
+                <a:sym typeface="Wingdings" panose="05000000000000000000" pitchFamily="2" charset="2"/>
+              </a:rPr>
+              <a:t> 多个特征 联合或单独 地对一个或多个特征有这样一个条件关系</a:t>
+            </a:r>
+            <a:endParaRPr lang="en-US" altLang="zh-CN" dirty="0" smtClean="0"/>
+          </a:p>
+          <a:p>
             <a:endParaRPr lang="zh-CN" altLang="en-US" dirty="0"/>
           </a:p>
         </p:txBody>
@@ -924,7 +1060,7 @@
           <a:p>
             <a:fld id="{54B2DB04-1C30-4E5B-BA41-14DB75A5FA96}" type="slidenum">
               <a:rPr lang="zh-CN" altLang="en-US" smtClean="0"/>
-              <a:t>13</a:t>
+              <a:t>10</a:t>
             </a:fld>
             <a:endParaRPr lang="zh-CN" altLang="en-US"/>
           </a:p>
@@ -933,7 +1069,7 @@
     </p:spTree>
     <p:extLst>
       <p:ext uri="{BB962C8B-B14F-4D97-AF65-F5344CB8AC3E}">
-        <p14:creationId xmlns:p14="http://schemas.microsoft.com/office/powerpoint/2010/main" val="4252222829"/>
+        <p14:creationId xmlns:p14="http://schemas.microsoft.com/office/powerpoint/2010/main" val="4207823297"/>
       </p:ext>
     </p:extLst>
   </p:cSld>
@@ -987,28 +1123,6 @@
           <a:bodyPr/>
           <a:lstStyle/>
           <a:p>
-            <a:r>
-              <a:rPr lang="en-US" altLang="zh-CN" dirty="0" smtClean="0"/>
-              <a:t>Need </a:t>
-            </a:r>
-            <a:r>
-              <a:rPr lang="en-US" altLang="zh-CN" dirty="0" err="1" smtClean="0"/>
-              <a:t>modifyed</a:t>
-            </a:r>
-            <a:r>
-              <a:rPr lang="en-US" altLang="zh-CN" dirty="0" smtClean="0"/>
-              <a:t>.</a:t>
-            </a:r>
-          </a:p>
-          <a:p>
-            <a:r>
-              <a:rPr lang="en-US" altLang="zh-CN" dirty="0" smtClean="0"/>
-              <a:t>See the</a:t>
-            </a:r>
-            <a:r>
-              <a:rPr lang="en-US" altLang="zh-CN" baseline="0" dirty="0" smtClean="0"/>
-              <a:t> paper printed.</a:t>
-            </a:r>
             <a:endParaRPr lang="zh-CN" altLang="en-US" dirty="0"/>
           </a:p>
         </p:txBody>
@@ -1030,7 +1144,7 @@
           <a:p>
             <a:fld id="{54B2DB04-1C30-4E5B-BA41-14DB75A5FA96}" type="slidenum">
               <a:rPr lang="zh-CN" altLang="en-US" smtClean="0"/>
-              <a:t>14</a:t>
+              <a:t>13</a:t>
             </a:fld>
             <a:endParaRPr lang="zh-CN" altLang="en-US"/>
           </a:p>
@@ -1039,7 +1153,7 @@
     </p:spTree>
     <p:extLst>
       <p:ext uri="{BB962C8B-B14F-4D97-AF65-F5344CB8AC3E}">
-        <p14:creationId xmlns:p14="http://schemas.microsoft.com/office/powerpoint/2010/main" val="4079196086"/>
+        <p14:creationId xmlns:p14="http://schemas.microsoft.com/office/powerpoint/2010/main" val="4252222829"/>
       </p:ext>
     </p:extLst>
   </p:cSld>
@@ -1095,153 +1209,26 @@
           <a:p>
             <a:r>
               <a:rPr lang="en-US" altLang="zh-CN" dirty="0" smtClean="0"/>
-              <a:t>Prototypes are a way of getting a picture of how the variables relate to the classification.</a:t>
-            </a:r>
-          </a:p>
-          <a:p>
+              <a:t>Need </a:t>
+            </a:r>
+            <a:r>
+              <a:rPr lang="en-US" altLang="zh-CN" dirty="0" err="1" smtClean="0"/>
+              <a:t>modifyed</a:t>
+            </a:r>
             <a:r>
               <a:rPr lang="en-US" altLang="zh-CN" dirty="0" smtClean="0"/>
-              <a:t>Where</a:t>
+              <a:t>.</a:t>
+            </a:r>
+          </a:p>
+          <a:p>
+            <a:r>
+              <a:rPr lang="en-US" altLang="zh-CN" dirty="0" smtClean="0"/>
+              <a:t>See the</a:t>
             </a:r>
             <a:r>
               <a:rPr lang="en-US" altLang="zh-CN" baseline="0" dirty="0" smtClean="0"/>
-              <a:t> is the relationship?</a:t>
-            </a:r>
-          </a:p>
-          <a:p>
-            <a:endParaRPr lang="en-US" altLang="zh-CN" baseline="0" dirty="0" smtClean="0"/>
-          </a:p>
-          <a:p>
-            <a:r>
-              <a:rPr lang="en-US" altLang="zh-CN" sz="1200" b="0" i="0" kern="1200" dirty="0" smtClean="0">
-                <a:solidFill>
-                  <a:schemeClr val="tx1"/>
-                </a:solidFill>
-                <a:effectLst/>
-                <a:latin typeface="+mn-lt"/>
-                <a:ea typeface="+mn-ea"/>
-                <a:cs typeface="+mn-cs"/>
-              </a:rPr>
-              <a:t>The association, or proximity, between cases is the number of times that they occur together in the same terminal node. These counts are normalized by dividing by the number of trees, producing a proximity matrix that can be </a:t>
-            </a:r>
-            <a:r>
-              <a:rPr lang="en-US" altLang="zh-CN" sz="1200" b="0" i="0" kern="1200" dirty="0" err="1" smtClean="0">
-                <a:solidFill>
-                  <a:schemeClr val="tx1"/>
-                </a:solidFill>
-                <a:effectLst/>
-                <a:latin typeface="+mn-lt"/>
-                <a:ea typeface="+mn-ea"/>
-                <a:cs typeface="+mn-cs"/>
-              </a:rPr>
-              <a:t>analysed</a:t>
-            </a:r>
-            <a:r>
-              <a:rPr lang="en-US" altLang="zh-CN" sz="1200" b="0" i="0" kern="1200" dirty="0" smtClean="0">
-                <a:solidFill>
-                  <a:schemeClr val="tx1"/>
-                </a:solidFill>
-                <a:effectLst/>
-                <a:latin typeface="+mn-lt"/>
-                <a:ea typeface="+mn-ea"/>
-                <a:cs typeface="+mn-cs"/>
-              </a:rPr>
-              <a:t> using a </a:t>
-            </a:r>
-            <a:r>
-              <a:rPr lang="en-US" altLang="zh-CN" sz="1200" b="0" i="0" u="none" strike="noStrike" kern="1200" dirty="0" smtClean="0">
-                <a:solidFill>
-                  <a:schemeClr val="tx1"/>
-                </a:solidFill>
-                <a:effectLst/>
-                <a:latin typeface="+mn-lt"/>
-                <a:ea typeface="+mn-ea"/>
-                <a:cs typeface="+mn-cs"/>
-                <a:hlinkClick r:id="rId3"/>
-              </a:rPr>
-              <a:t>metric </a:t>
-            </a:r>
-            <a:r>
-              <a:rPr lang="en-US" altLang="zh-CN" sz="1200" b="0" i="0" u="none" strike="noStrike" kern="1200" dirty="0" err="1" smtClean="0">
-                <a:solidFill>
-                  <a:schemeClr val="tx1"/>
-                </a:solidFill>
-                <a:effectLst/>
-                <a:latin typeface="+mn-lt"/>
-                <a:ea typeface="+mn-ea"/>
-                <a:cs typeface="+mn-cs"/>
-                <a:hlinkClick r:id="rId3"/>
-              </a:rPr>
-              <a:t>scaling</a:t>
-            </a:r>
-            <a:r>
-              <a:rPr lang="en-US" altLang="zh-CN" sz="1200" b="0" i="0" kern="1200" dirty="0" err="1" smtClean="0">
-                <a:solidFill>
-                  <a:schemeClr val="tx1"/>
-                </a:solidFill>
-                <a:effectLst/>
-                <a:latin typeface="+mn-lt"/>
-                <a:ea typeface="+mn-ea"/>
-                <a:cs typeface="+mn-cs"/>
-              </a:rPr>
-              <a:t>method</a:t>
-            </a:r>
-            <a:r>
-              <a:rPr lang="en-US" altLang="zh-CN" sz="1200" b="0" i="0" kern="1200" dirty="0" smtClean="0">
-                <a:solidFill>
-                  <a:schemeClr val="tx1"/>
-                </a:solidFill>
-                <a:effectLst/>
-                <a:latin typeface="+mn-lt"/>
-                <a:ea typeface="+mn-ea"/>
-                <a:cs typeface="+mn-cs"/>
-              </a:rPr>
-              <a:t>. Apart from showing the proximity of cases these distance matrices, and their metrically scaled projections, can be used to:</a:t>
-            </a:r>
-          </a:p>
-          <a:p>
-            <a:r>
-              <a:rPr lang="en-US" altLang="zh-CN" sz="1200" b="0" i="0" kern="1200" dirty="0" smtClean="0">
-                <a:solidFill>
-                  <a:schemeClr val="tx1"/>
-                </a:solidFill>
-                <a:effectLst/>
-                <a:latin typeface="+mn-lt"/>
-                <a:ea typeface="+mn-ea"/>
-                <a:cs typeface="+mn-cs"/>
-              </a:rPr>
-              <a:t>replace missing values,</a:t>
-            </a:r>
-          </a:p>
-          <a:p>
-            <a:r>
-              <a:rPr lang="en-US" altLang="zh-CN" sz="1200" b="0" i="0" kern="1200" dirty="0" smtClean="0">
-                <a:solidFill>
-                  <a:schemeClr val="tx1"/>
-                </a:solidFill>
-                <a:effectLst/>
-                <a:latin typeface="+mn-lt"/>
-                <a:ea typeface="+mn-ea"/>
-                <a:cs typeface="+mn-cs"/>
-              </a:rPr>
-              <a:t>locate outliers and</a:t>
-            </a:r>
-          </a:p>
-          <a:p>
-            <a:r>
-              <a:rPr lang="en-US" altLang="zh-CN" sz="1200" b="0" i="0" kern="1200" dirty="0" smtClean="0">
-                <a:solidFill>
-                  <a:schemeClr val="tx1"/>
-                </a:solidFill>
-                <a:effectLst/>
-                <a:latin typeface="+mn-lt"/>
-                <a:ea typeface="+mn-ea"/>
-                <a:cs typeface="+mn-cs"/>
-              </a:rPr>
-              <a:t>investigate how the predictors separate the classes by locating 'prototypes'.</a:t>
-            </a:r>
-          </a:p>
-          <a:p>
+              <a:t> paper printed.</a:t>
+            </a:r>
             <a:endParaRPr lang="zh-CN" altLang="en-US" dirty="0"/>
           </a:p>
         </p:txBody>
@@ -1263,7 +1250,7 @@
           <a:p>
             <a:fld id="{54B2DB04-1C30-4E5B-BA41-14DB75A5FA96}" type="slidenum">
               <a:rPr lang="zh-CN" altLang="en-US" smtClean="0"/>
-              <a:t>18</a:t>
+              <a:t>14</a:t>
             </a:fld>
             <a:endParaRPr lang="zh-CN" altLang="en-US"/>
           </a:p>
@@ -1272,7 +1259,7 @@
     </p:spTree>
     <p:extLst>
       <p:ext uri="{BB962C8B-B14F-4D97-AF65-F5344CB8AC3E}">
-        <p14:creationId xmlns:p14="http://schemas.microsoft.com/office/powerpoint/2010/main" val="2650148120"/>
+        <p14:creationId xmlns:p14="http://schemas.microsoft.com/office/powerpoint/2010/main" val="4079196086"/>
       </p:ext>
     </p:extLst>
   </p:cSld>
@@ -1326,6 +1313,26 @@
           <a:bodyPr/>
           <a:lstStyle/>
           <a:p>
+            <a:r>
+              <a:rPr lang="zh-CN" altLang="en-US" dirty="0" smtClean="0"/>
+              <a:t>检测 </a:t>
+            </a:r>
+            <a:r>
+              <a:rPr lang="en-US" altLang="zh-CN" dirty="0" smtClean="0"/>
+              <a:t>1</a:t>
+            </a:r>
+            <a:r>
+              <a:rPr lang="zh-CN" altLang="en-US" dirty="0" smtClean="0"/>
+              <a:t>对</a:t>
+            </a:r>
+            <a:r>
+              <a:rPr lang="en-US" altLang="zh-CN" dirty="0" smtClean="0"/>
+              <a:t>1 </a:t>
+            </a:r>
+            <a:r>
+              <a:rPr lang="zh-CN" altLang="en-US" dirty="0" smtClean="0"/>
+              <a:t>有相关关系这种情况</a:t>
+            </a:r>
             <a:endParaRPr lang="zh-CN" altLang="en-US" dirty="0"/>
           </a:p>
         </p:txBody>
@@ -1347,7 +1354,7 @@
           <a:p>
             <a:fld id="{54B2DB04-1C30-4E5B-BA41-14DB75A5FA96}" type="slidenum">
               <a:rPr lang="zh-CN" altLang="en-US" smtClean="0"/>
-              <a:t>23</a:t>
+              <a:t>15</a:t>
             </a:fld>
             <a:endParaRPr lang="zh-CN" altLang="en-US"/>
           </a:p>
@@ -1356,7 +1363,240 @@
     </p:spTree>
     <p:extLst>
       <p:ext uri="{BB962C8B-B14F-4D97-AF65-F5344CB8AC3E}">
-        <p14:creationId xmlns:p14="http://schemas.microsoft.com/office/powerpoint/2010/main" val="2191718827"/>
+        <p14:creationId xmlns:p14="http://schemas.microsoft.com/office/powerpoint/2010/main" val="3597729750"/>
+      </p:ext>
+    </p:extLst>
+  </p:cSld>
+  <p:clrMapOvr>
+    <a:masterClrMapping/>
+  </p:clrMapOvr>
+</p:notes>
+</file>
+
+<file path=ppt/notesSlides/notesSlide9.xml><?xml version="1.0" encoding="utf-8"?>
+<p:notes xmlns:a="http://schemas.openxmlformats.org/drawingml/2006/main" xmlns:r="http://schemas.openxmlformats.org/officeDocument/2006/relationships" xmlns:p="http://schemas.openxmlformats.org/presentationml/2006/main">
+  <p:cSld>
+    <p:spTree>
+      <p:nvGrpSpPr>
+        <p:cNvPr id="1" name=""/>
+        <p:cNvGrpSpPr/>
+        <p:nvPr/>
+      </p:nvGrpSpPr>
+      <p:grpSpPr>
+        <a:xfrm>
+          <a:off x="0" y="0"/>
+          <a:ext cx="0" cy="0"/>
+          <a:chOff x="0" y="0"/>
+          <a:chExt cx="0" cy="0"/>
+        </a:xfrm>
+      </p:grpSpPr>
+      <p:sp>
+        <p:nvSpPr>
+          <p:cNvPr id="2" name="幻灯片图像占位符 1"/>
+          <p:cNvSpPr>
+            <a:spLocks noGrp="1" noRot="1" noChangeAspect="1"/>
+          </p:cNvSpPr>
+          <p:nvPr>
+            <p:ph type="sldImg"/>
+          </p:nvPr>
+        </p:nvSpPr>
+        <p:spPr/>
+      </p:sp>
+      <p:sp>
+        <p:nvSpPr>
+          <p:cNvPr id="3" name="备注占位符 2"/>
+          <p:cNvSpPr>
+            <a:spLocks noGrp="1"/>
+          </p:cNvSpPr>
+          <p:nvPr>
+            <p:ph type="body" idx="1"/>
+          </p:nvPr>
+        </p:nvSpPr>
+        <p:spPr/>
+        <p:txBody>
+          <a:bodyPr/>
+          <a:lstStyle/>
+          <a:p>
+            <a:r>
+              <a:rPr lang="en-US" altLang="zh-CN" dirty="0" smtClean="0"/>
+              <a:t>Prototypes are a way of getting a picture of how the variables relate to the classification.</a:t>
+            </a:r>
+          </a:p>
+          <a:p>
+            <a:r>
+              <a:rPr lang="en-US" altLang="zh-CN" dirty="0" smtClean="0"/>
+              <a:t>Where</a:t>
+            </a:r>
+            <a:r>
+              <a:rPr lang="en-US" altLang="zh-CN" baseline="0" dirty="0" smtClean="0"/>
+              <a:t> is the relationship?</a:t>
+            </a:r>
+          </a:p>
+          <a:p>
+            <a:endParaRPr lang="en-US" altLang="zh-CN" baseline="0" dirty="0" smtClean="0"/>
+          </a:p>
+          <a:p>
+            <a:r>
+              <a:rPr lang="en-US" altLang="zh-CN" sz="1200" b="0" i="0" kern="1200" dirty="0" smtClean="0">
+                <a:solidFill>
+                  <a:schemeClr val="tx1"/>
+                </a:solidFill>
+                <a:effectLst/>
+                <a:latin typeface="+mn-lt"/>
+                <a:ea typeface="+mn-ea"/>
+                <a:cs typeface="+mn-cs"/>
+              </a:rPr>
+              <a:t>The association, or proximity, between cases is the number of times that they occur together in the same terminal node. These counts are normalized by dividing by the number of trees, producing a proximity matrix that can be </a:t>
+            </a:r>
+            <a:r>
+              <a:rPr lang="en-US" altLang="zh-CN" sz="1200" b="0" i="0" kern="1200" dirty="0" err="1" smtClean="0">
+                <a:solidFill>
+                  <a:schemeClr val="tx1"/>
+                </a:solidFill>
+                <a:effectLst/>
+                <a:latin typeface="+mn-lt"/>
+                <a:ea typeface="+mn-ea"/>
+                <a:cs typeface="+mn-cs"/>
+              </a:rPr>
+              <a:t>analysed</a:t>
+            </a:r>
+            <a:r>
+              <a:rPr lang="en-US" altLang="zh-CN" sz="1200" b="0" i="0" kern="1200" dirty="0" smtClean="0">
+                <a:solidFill>
+                  <a:schemeClr val="tx1"/>
+                </a:solidFill>
+                <a:effectLst/>
+                <a:latin typeface="+mn-lt"/>
+                <a:ea typeface="+mn-ea"/>
+                <a:cs typeface="+mn-cs"/>
+              </a:rPr>
+              <a:t> using a </a:t>
+            </a:r>
+            <a:r>
+              <a:rPr lang="en-US" altLang="zh-CN" sz="1200" b="0" i="0" u="none" strike="noStrike" kern="1200" dirty="0" smtClean="0">
+                <a:solidFill>
+                  <a:schemeClr val="tx1"/>
+                </a:solidFill>
+                <a:effectLst/>
+                <a:latin typeface="+mn-lt"/>
+                <a:ea typeface="+mn-ea"/>
+                <a:cs typeface="+mn-cs"/>
+                <a:hlinkClick r:id="rId3"/>
+              </a:rPr>
+              <a:t>metric </a:t>
+            </a:r>
+            <a:r>
+              <a:rPr lang="en-US" altLang="zh-CN" sz="1200" b="0" i="0" u="none" strike="noStrike" kern="1200" dirty="0" err="1" smtClean="0">
+                <a:solidFill>
+                  <a:schemeClr val="tx1"/>
+                </a:solidFill>
+                <a:effectLst/>
+                <a:latin typeface="+mn-lt"/>
+                <a:ea typeface="+mn-ea"/>
+                <a:cs typeface="+mn-cs"/>
+                <a:hlinkClick r:id="rId3"/>
+              </a:rPr>
+              <a:t>scaling</a:t>
+            </a:r>
+            <a:r>
+              <a:rPr lang="en-US" altLang="zh-CN" sz="1200" b="0" i="0" kern="1200" dirty="0" err="1" smtClean="0">
+                <a:solidFill>
+                  <a:schemeClr val="tx1"/>
+                </a:solidFill>
+                <a:effectLst/>
+                <a:latin typeface="+mn-lt"/>
+                <a:ea typeface="+mn-ea"/>
+                <a:cs typeface="+mn-cs"/>
+              </a:rPr>
+              <a:t>method</a:t>
+            </a:r>
+            <a:r>
+              <a:rPr lang="en-US" altLang="zh-CN" sz="1200" b="0" i="0" kern="1200" dirty="0" smtClean="0">
+                <a:solidFill>
+                  <a:schemeClr val="tx1"/>
+                </a:solidFill>
+                <a:effectLst/>
+                <a:latin typeface="+mn-lt"/>
+                <a:ea typeface="+mn-ea"/>
+                <a:cs typeface="+mn-cs"/>
+              </a:rPr>
+              <a:t>. Apart from showing the proximity of cases these distance matrices, and their metrically scaled projections, can be used to:</a:t>
+            </a:r>
+          </a:p>
+          <a:p>
+            <a:r>
+              <a:rPr lang="en-US" altLang="zh-CN" sz="1200" b="0" i="0" kern="1200" dirty="0" smtClean="0">
+                <a:solidFill>
+                  <a:schemeClr val="tx1"/>
+                </a:solidFill>
+                <a:effectLst/>
+                <a:latin typeface="+mn-lt"/>
+                <a:ea typeface="+mn-ea"/>
+                <a:cs typeface="+mn-cs"/>
+              </a:rPr>
+              <a:t>replace missing values,</a:t>
+            </a:r>
+          </a:p>
+          <a:p>
+            <a:r>
+              <a:rPr lang="en-US" altLang="zh-CN" sz="1200" b="0" i="0" kern="1200" dirty="0" smtClean="0">
+                <a:solidFill>
+                  <a:schemeClr val="tx1"/>
+                </a:solidFill>
+                <a:effectLst/>
+                <a:latin typeface="+mn-lt"/>
+                <a:ea typeface="+mn-ea"/>
+                <a:cs typeface="+mn-cs"/>
+              </a:rPr>
+              <a:t>locate outliers and</a:t>
+            </a:r>
+          </a:p>
+          <a:p>
+            <a:r>
+              <a:rPr lang="en-US" altLang="zh-CN" sz="1200" b="0" i="0" kern="1200" dirty="0" smtClean="0">
+                <a:solidFill>
+                  <a:schemeClr val="tx1"/>
+                </a:solidFill>
+                <a:effectLst/>
+                <a:latin typeface="+mn-lt"/>
+                <a:ea typeface="+mn-ea"/>
+                <a:cs typeface="+mn-cs"/>
+              </a:rPr>
+              <a:t>investigate how the predictors separate the classes by locating 'prototypes'.</a:t>
+            </a:r>
+          </a:p>
+          <a:p>
+            <a:endParaRPr lang="zh-CN" altLang="en-US" dirty="0"/>
+          </a:p>
+        </p:txBody>
+      </p:sp>
+      <p:sp>
+        <p:nvSpPr>
+          <p:cNvPr id="4" name="灯片编号占位符 3"/>
+          <p:cNvSpPr>
+            <a:spLocks noGrp="1"/>
+          </p:cNvSpPr>
+          <p:nvPr>
+            <p:ph type="sldNum" sz="quarter" idx="10"/>
+          </p:nvPr>
+        </p:nvSpPr>
+        <p:spPr/>
+        <p:txBody>
+          <a:bodyPr/>
+          <a:lstStyle/>
+          <a:p>
+            <a:fld id="{54B2DB04-1C30-4E5B-BA41-14DB75A5FA96}" type="slidenum">
+              <a:rPr lang="zh-CN" altLang="en-US" smtClean="0"/>
+              <a:t>18</a:t>
+            </a:fld>
+            <a:endParaRPr lang="zh-CN" altLang="en-US"/>
+          </a:p>
+        </p:txBody>
+      </p:sp>
+    </p:spTree>
+    <p:extLst>
+      <p:ext uri="{BB962C8B-B14F-4D97-AF65-F5344CB8AC3E}">
+        <p14:creationId xmlns:p14="http://schemas.microsoft.com/office/powerpoint/2010/main" val="2650148120"/>
       </p:ext>
     </p:extLst>
   </p:cSld>
@@ -1497,7 +1737,7 @@
           <a:p>
             <a:fld id="{3237AD8D-84C2-4802-BD53-8A66912A6EA2}" type="datetimeFigureOut">
               <a:rPr lang="zh-CN" altLang="en-US" smtClean="0"/>
-              <a:t>2016/9/7</a:t>
+              <a:t>2016/9/9</a:t>
             </a:fld>
             <a:endParaRPr lang="zh-CN" altLang="en-US"/>
           </a:p>
@@ -1667,7 +1907,7 @@
           <a:p>
             <a:fld id="{3237AD8D-84C2-4802-BD53-8A66912A6EA2}" type="datetimeFigureOut">
               <a:rPr lang="zh-CN" altLang="en-US" smtClean="0"/>
-              <a:t>2016/9/7</a:t>
+              <a:t>2016/9/9</a:t>
             </a:fld>
             <a:endParaRPr lang="zh-CN" altLang="en-US"/>
           </a:p>
@@ -1847,7 +2087,7 @@
           <a:p>
             <a:fld id="{3237AD8D-84C2-4802-BD53-8A66912A6EA2}" type="datetimeFigureOut">
               <a:rPr lang="zh-CN" altLang="en-US" smtClean="0"/>
-              <a:t>2016/9/7</a:t>
+              <a:t>2016/9/9</a:t>
             </a:fld>
             <a:endParaRPr lang="zh-CN" altLang="en-US"/>
           </a:p>
@@ -2017,7 +2257,7 @@
           <a:p>
             <a:fld id="{3237AD8D-84C2-4802-BD53-8A66912A6EA2}" type="datetimeFigureOut">
               <a:rPr lang="zh-CN" altLang="en-US" smtClean="0"/>
-              <a:t>2016/9/7</a:t>
+              <a:t>2016/9/9</a:t>
             </a:fld>
             <a:endParaRPr lang="zh-CN" altLang="en-US"/>
           </a:p>
@@ -2263,7 +2503,7 @@
           <a:p>
             <a:fld id="{3237AD8D-84C2-4802-BD53-8A66912A6EA2}" type="datetimeFigureOut">
               <a:rPr lang="zh-CN" altLang="en-US" smtClean="0"/>
-              <a:t>2016/9/7</a:t>
+              <a:t>2016/9/9</a:t>
             </a:fld>
             <a:endParaRPr lang="zh-CN" altLang="en-US"/>
           </a:p>
@@ -2495,7 +2735,7 @@
           <a:p>
             <a:fld id="{3237AD8D-84C2-4802-BD53-8A66912A6EA2}" type="datetimeFigureOut">
               <a:rPr lang="zh-CN" altLang="en-US" smtClean="0"/>
-              <a:t>2016/9/7</a:t>
+              <a:t>2016/9/9</a:t>
             </a:fld>
             <a:endParaRPr lang="zh-CN" altLang="en-US"/>
           </a:p>
@@ -2862,7 +3102,7 @@
           <a:p>
             <a:fld id="{3237AD8D-84C2-4802-BD53-8A66912A6EA2}" type="datetimeFigureOut">
               <a:rPr lang="zh-CN" altLang="en-US" smtClean="0"/>
-              <a:t>2016/9/7</a:t>
+              <a:t>2016/9/9</a:t>
             </a:fld>
             <a:endParaRPr lang="zh-CN" altLang="en-US"/>
           </a:p>
@@ -2980,7 +3220,7 @@
           <a:p>
             <a:fld id="{3237AD8D-84C2-4802-BD53-8A66912A6EA2}" type="datetimeFigureOut">
               <a:rPr lang="zh-CN" altLang="en-US" smtClean="0"/>
-              <a:t>2016/9/7</a:t>
+              <a:t>2016/9/9</a:t>
             </a:fld>
             <a:endParaRPr lang="zh-CN" altLang="en-US"/>
           </a:p>
@@ -3075,7 +3315,7 @@
           <a:p>
             <a:fld id="{3237AD8D-84C2-4802-BD53-8A66912A6EA2}" type="datetimeFigureOut">
               <a:rPr lang="zh-CN" altLang="en-US" smtClean="0"/>
-              <a:t>2016/9/7</a:t>
+              <a:t>2016/9/9</a:t>
             </a:fld>
             <a:endParaRPr lang="zh-CN" altLang="en-US"/>
           </a:p>
@@ -3352,7 +3592,7 @@
           <a:p>
             <a:fld id="{3237AD8D-84C2-4802-BD53-8A66912A6EA2}" type="datetimeFigureOut">
               <a:rPr lang="zh-CN" altLang="en-US" smtClean="0"/>
-              <a:t>2016/9/7</a:t>
+              <a:t>2016/9/9</a:t>
             </a:fld>
             <a:endParaRPr lang="zh-CN" altLang="en-US"/>
           </a:p>
@@ -3605,7 +3845,7 @@
           <a:p>
             <a:fld id="{3237AD8D-84C2-4802-BD53-8A66912A6EA2}" type="datetimeFigureOut">
               <a:rPr lang="zh-CN" altLang="en-US" smtClean="0"/>
-              <a:t>2016/9/7</a:t>
+              <a:t>2016/9/9</a:t>
             </a:fld>
             <a:endParaRPr lang="zh-CN" altLang="en-US"/>
           </a:p>
@@ -3838,7 +4078,7 @@
           <a:p>
             <a:fld id="{3237AD8D-84C2-4802-BD53-8A66912A6EA2}" type="datetimeFigureOut">
               <a:rPr lang="zh-CN" altLang="en-US" smtClean="0"/>
-              <a:t>2016/9/7</a:t>
+              <a:t>2016/9/9</a:t>
             </a:fld>
             <a:endParaRPr lang="zh-CN" altLang="en-US"/>
           </a:p>
@@ -4289,7 +4529,7 @@
           <a:p>
             <a:r>
               <a:rPr lang="en-US" altLang="zh-CN" dirty="0" smtClean="0"/>
-              <a:t>2016.8.7</a:t>
+              <a:t>2016.9.9</a:t>
             </a:r>
             <a:endParaRPr lang="zh-CN" altLang="en-US" dirty="0"/>
           </a:p>
@@ -4381,8 +4621,8 @@
         </p:nvSpPr>
         <p:spPr>
           <a:xfrm>
-            <a:off x="7968343" y="5584371"/>
-            <a:ext cx="3363686" cy="1200329"/>
+            <a:off x="7968343" y="5257800"/>
+            <a:ext cx="3363686" cy="1477328"/>
           </a:xfrm>
           <a:prstGeom prst="rect">
             <a:avLst/>
@@ -4397,11 +4637,17 @@
           <a:p>
             <a:r>
               <a:rPr lang="en-US" altLang="zh-CN" dirty="0" smtClean="0"/>
-              <a:t>Construction of </a:t>
-            </a:r>
-            <a:r>
-              <a:rPr lang="en-US" altLang="zh-CN" smtClean="0"/>
-              <a:t>a Tree.</a:t>
+              <a:t>9.9</a:t>
+            </a:r>
+          </a:p>
+          <a:p>
+            <a:r>
+              <a:rPr lang="en-US" altLang="zh-CN" dirty="0" smtClean="0"/>
+              <a:t>Construction </a:t>
+            </a:r>
+            <a:r>
+              <a:rPr lang="en-US" altLang="zh-CN" dirty="0" smtClean="0"/>
+              <a:t>of a Tree.</a:t>
             </a:r>
           </a:p>
           <a:p>
@@ -4492,6 +4738,10 @@
           <a:p>
             <a:r>
               <a:rPr lang="en-GB" altLang="zh-CN" dirty="0" smtClean="0"/>
+              <a:t>Variable </a:t>
+            </a:r>
+            <a:r>
+              <a:rPr lang="en-GB" altLang="zh-CN" dirty="0" smtClean="0"/>
               <a:t>Interactions</a:t>
             </a:r>
             <a:endParaRPr lang="zh-CN" altLang="en-US" dirty="0"/>
@@ -4517,8 +4767,13 @@
           <a:p>
             <a:r>
               <a:rPr lang="en-US" altLang="zh-CN" sz="3200" dirty="0" smtClean="0"/>
-              <a:t>What is interactions?</a:t>
-            </a:r>
+              <a:t>What is </a:t>
+            </a:r>
+            <a:r>
+              <a:rPr lang="en-US" altLang="zh-CN" sz="3200" dirty="0" smtClean="0"/>
+              <a:t>‘interactions’?</a:t>
+            </a:r>
+            <a:endParaRPr lang="en-US" altLang="zh-CN" sz="3200" dirty="0" smtClean="0"/>
           </a:p>
           <a:p>
             <a:pPr lvl="1"/>
@@ -4574,12 +4829,19 @@
               <a:rPr lang="en-US" altLang="zh-CN" sz="2800" dirty="0" smtClean="0"/>
               <a:t>.</a:t>
             </a:r>
+            <a:r>
+              <a:rPr lang="en-US" altLang="zh-CN" sz="1800" dirty="0" smtClean="0">
+                <a:hlinkClick r:id="rId3"/>
+              </a:rPr>
+              <a:t>[source]</a:t>
+            </a:r>
+            <a:endParaRPr lang="en-US" altLang="zh-CN" sz="1800" dirty="0" smtClean="0"/>
           </a:p>
           <a:p>
             <a:pPr lvl="1"/>
             <a:r>
               <a:rPr lang="en-US" altLang="zh-CN" sz="2800" dirty="0" smtClean="0">
-                <a:hlinkClick r:id="rId2"/>
+                <a:hlinkClick r:id="rId4"/>
               </a:rPr>
               <a:t>Another way </a:t>
             </a:r>
@@ -4595,18 +4857,18 @@
           <a:p>
             <a:pPr lvl="1"/>
             <a:r>
-              <a:rPr lang="en-US" altLang="zh-CN" sz="2800" b="1" dirty="0" err="1" smtClean="0">
-                <a:hlinkClick r:id="rId3"/>
+              <a:rPr lang="en-US" altLang="zh-CN" sz="2800" b="1" dirty="0" smtClean="0">
+                <a:hlinkClick r:id="rId5"/>
               </a:rPr>
               <a:t>Interaction</a:t>
             </a:r>
             <a:r>
-              <a:rPr lang="en-US" altLang="zh-CN" sz="2800" dirty="0" err="1" smtClean="0"/>
-              <a:t>When</a:t>
+              <a:rPr lang="en-US" altLang="zh-CN" sz="2800" b="1" dirty="0" smtClean="0"/>
+              <a:t> </a:t>
             </a:r>
             <a:r>
               <a:rPr lang="en-US" altLang="zh-CN" sz="2800" dirty="0" smtClean="0"/>
-              <a:t> </a:t>
+              <a:t>When </a:t>
             </a:r>
             <a:r>
               <a:rPr lang="en-US" altLang="zh-CN" sz="2800" dirty="0"/>
@@ -4716,6 +4978,13 @@
   <p:clrMapOvr>
     <a:masterClrMapping/>
   </p:clrMapOvr>
+  <p:timing>
+    <p:tnLst>
+      <p:par>
+        <p:cTn id="1" dur="indefinite" restart="never" nodeType="tmRoot"/>
+      </p:par>
+    </p:tnLst>
+  </p:timing>
 </p:sld>
 </file>
 
@@ -6450,6 +6719,13 @@
   <p:clrMapOvr>
     <a:masterClrMapping/>
   </p:clrMapOvr>
+  <p:timing>
+    <p:tnLst>
+      <p:par>
+        <p:cTn id="1" dur="indefinite" restart="never" nodeType="tmRoot"/>
+      </p:par>
+    </p:tnLst>
+  </p:timing>
 </p:sld>
 </file>
 
@@ -7041,6 +7317,13 @@
   <p:clrMapOvr>
     <a:masterClrMapping/>
   </p:clrMapOvr>
+  <p:timing>
+    <p:tnLst>
+      <p:par>
+        <p:cTn id="1" dur="indefinite" restart="never" nodeType="tmRoot"/>
+      </p:par>
+    </p:tnLst>
+  </p:timing>
 </p:sld>
 </file>
 
@@ -7361,6 +7644,13 @@
   <p:clrMapOvr>
     <a:masterClrMapping/>
   </p:clrMapOvr>
+  <p:timing>
+    <p:tnLst>
+      <p:par>
+        <p:cTn id="1" dur="indefinite" restart="never" nodeType="tmRoot"/>
+      </p:par>
+    </p:tnLst>
+  </p:timing>
 </p:sld>
 </file>
 
@@ -7888,7 +8178,7 @@
                 <a:ext cx="10515600" cy="5694363"/>
               </a:xfrm>
               <a:blipFill rotWithShape="0">
-                <a:blip r:embed="rId2"/>
+                <a:blip r:embed="rId3"/>
                 <a:stretch>
                   <a:fillRect l="-1217" t="-1713"/>
                 </a:stretch>
@@ -7919,6 +8209,13 @@
   <p:clrMapOvr>
     <a:masterClrMapping/>
   </p:clrMapOvr>
+  <p:timing>
+    <p:tnLst>
+      <p:par>
+        <p:cTn id="1" dur="indefinite" restart="never" nodeType="tmRoot"/>
+      </p:par>
+    </p:tnLst>
+  </p:timing>
 </p:sld>
 </file>
 

</xml_diff>